<commit_message>
Mon ERD and Pitchbook Update
</commit_message>
<xml_diff>
--- a/Rodgers_Pitchbook_PewlettHackard.pptx
+++ b/Rodgers_Pitchbook_PewlettHackard.pptx
@@ -272,7 +272,7 @@
           <a:p>
             <a:fld id="{ECFF5693-D71E-4919-B8B6-E582AC32EA67}" type="datetimeFigureOut">
               <a:rPr lang="en-US" smtClean="0"/>
-              <a:t>11/6/2020</a:t>
+              <a:t>11/9/2020</a:t>
             </a:fld>
             <a:endParaRPr lang="en-US"/>
           </a:p>
@@ -470,7 +470,7 @@
           <a:p>
             <a:fld id="{ECFF5693-D71E-4919-B8B6-E582AC32EA67}" type="datetimeFigureOut">
               <a:rPr lang="en-US" smtClean="0"/>
-              <a:t>11/6/2020</a:t>
+              <a:t>11/9/2020</a:t>
             </a:fld>
             <a:endParaRPr lang="en-US"/>
           </a:p>
@@ -678,7 +678,7 @@
           <a:p>
             <a:fld id="{ECFF5693-D71E-4919-B8B6-E582AC32EA67}" type="datetimeFigureOut">
               <a:rPr lang="en-US" smtClean="0"/>
-              <a:t>11/6/2020</a:t>
+              <a:t>11/9/2020</a:t>
             </a:fld>
             <a:endParaRPr lang="en-US"/>
           </a:p>
@@ -876,7 +876,7 @@
           <a:p>
             <a:fld id="{ECFF5693-D71E-4919-B8B6-E582AC32EA67}" type="datetimeFigureOut">
               <a:rPr lang="en-US" smtClean="0"/>
-              <a:t>11/6/2020</a:t>
+              <a:t>11/9/2020</a:t>
             </a:fld>
             <a:endParaRPr lang="en-US"/>
           </a:p>
@@ -1151,7 +1151,7 @@
           <a:p>
             <a:fld id="{ECFF5693-D71E-4919-B8B6-E582AC32EA67}" type="datetimeFigureOut">
               <a:rPr lang="en-US" smtClean="0"/>
-              <a:t>11/6/2020</a:t>
+              <a:t>11/9/2020</a:t>
             </a:fld>
             <a:endParaRPr lang="en-US"/>
           </a:p>
@@ -1416,7 +1416,7 @@
           <a:p>
             <a:fld id="{ECFF5693-D71E-4919-B8B6-E582AC32EA67}" type="datetimeFigureOut">
               <a:rPr lang="en-US" smtClean="0"/>
-              <a:t>11/6/2020</a:t>
+              <a:t>11/9/2020</a:t>
             </a:fld>
             <a:endParaRPr lang="en-US"/>
           </a:p>
@@ -1828,7 +1828,7 @@
           <a:p>
             <a:fld id="{ECFF5693-D71E-4919-B8B6-E582AC32EA67}" type="datetimeFigureOut">
               <a:rPr lang="en-US" smtClean="0"/>
-              <a:t>11/6/2020</a:t>
+              <a:t>11/9/2020</a:t>
             </a:fld>
             <a:endParaRPr lang="en-US"/>
           </a:p>
@@ -1969,7 +1969,7 @@
           <a:p>
             <a:fld id="{ECFF5693-D71E-4919-B8B6-E582AC32EA67}" type="datetimeFigureOut">
               <a:rPr lang="en-US" smtClean="0"/>
-              <a:t>11/6/2020</a:t>
+              <a:t>11/9/2020</a:t>
             </a:fld>
             <a:endParaRPr lang="en-US"/>
           </a:p>
@@ -2082,7 +2082,7 @@
           <a:p>
             <a:fld id="{ECFF5693-D71E-4919-B8B6-E582AC32EA67}" type="datetimeFigureOut">
               <a:rPr lang="en-US" smtClean="0"/>
-              <a:t>11/6/2020</a:t>
+              <a:t>11/9/2020</a:t>
             </a:fld>
             <a:endParaRPr lang="en-US"/>
           </a:p>
@@ -2393,7 +2393,7 @@
           <a:p>
             <a:fld id="{ECFF5693-D71E-4919-B8B6-E582AC32EA67}" type="datetimeFigureOut">
               <a:rPr lang="en-US" smtClean="0"/>
-              <a:t>11/6/2020</a:t>
+              <a:t>11/9/2020</a:t>
             </a:fld>
             <a:endParaRPr lang="en-US"/>
           </a:p>
@@ -2681,7 +2681,7 @@
           <a:p>
             <a:fld id="{ECFF5693-D71E-4919-B8B6-E582AC32EA67}" type="datetimeFigureOut">
               <a:rPr lang="en-US" smtClean="0"/>
-              <a:t>11/6/2020</a:t>
+              <a:t>11/9/2020</a:t>
             </a:fld>
             <a:endParaRPr lang="en-US"/>
           </a:p>
@@ -2922,7 +2922,7 @@
           <a:p>
             <a:fld id="{ECFF5693-D71E-4919-B8B6-E582AC32EA67}" type="datetimeFigureOut">
               <a:rPr lang="en-US" smtClean="0"/>
-              <a:t>11/6/2020</a:t>
+              <a:t>11/9/2020</a:t>
             </a:fld>
             <a:endParaRPr lang="en-US"/>
           </a:p>
@@ -4650,10 +4650,10 @@
       </p:sp>
       <p:pic>
         <p:nvPicPr>
-          <p:cNvPr id="3" name="Picture 2">
-            <a:extLst>
-              <a:ext uri="{FF2B5EF4-FFF2-40B4-BE49-F238E27FC236}">
-                <a16:creationId xmlns:a16="http://schemas.microsoft.com/office/drawing/2014/main" id="{64743434-9B08-4EBB-AB97-CBBBDA060CE8}"/>
+          <p:cNvPr id="5" name="Picture 4">
+            <a:extLst>
+              <a:ext uri="{FF2B5EF4-FFF2-40B4-BE49-F238E27FC236}">
+                <a16:creationId xmlns:a16="http://schemas.microsoft.com/office/drawing/2014/main" id="{FF1DE7C4-59AC-4A8E-AF29-5643E60AD1C7}"/>
               </a:ext>
             </a:extLst>
           </p:cNvPr>
@@ -4670,8 +4670,8 @@
         </p:blipFill>
         <p:spPr>
           <a:xfrm>
-            <a:off x="838200" y="1690688"/>
-            <a:ext cx="10142220" cy="4038600"/>
+            <a:off x="1024890" y="1501140"/>
+            <a:ext cx="10142220" cy="3855720"/>
           </a:xfrm>
           <a:prstGeom prst="rect">
             <a:avLst/>

</xml_diff>

<commit_message>
Final submit prior to homework submit
</commit_message>
<xml_diff>
--- a/Rodgers_Pitchbook_PewlettHackard.pptx
+++ b/Rodgers_Pitchbook_PewlettHackard.pptx
@@ -8,17 +8,18 @@
     <p:sldId id="256" r:id="rId2"/>
     <p:sldId id="268" r:id="rId3"/>
     <p:sldId id="270" r:id="rId4"/>
-    <p:sldId id="269" r:id="rId5"/>
-    <p:sldId id="271" r:id="rId6"/>
-    <p:sldId id="272" r:id="rId7"/>
-    <p:sldId id="273" r:id="rId8"/>
-    <p:sldId id="275" r:id="rId9"/>
-    <p:sldId id="277" r:id="rId10"/>
-    <p:sldId id="278" r:id="rId11"/>
-    <p:sldId id="279" r:id="rId12"/>
-    <p:sldId id="280" r:id="rId13"/>
-    <p:sldId id="281" r:id="rId14"/>
-    <p:sldId id="276" r:id="rId15"/>
+    <p:sldId id="282" r:id="rId5"/>
+    <p:sldId id="283" r:id="rId6"/>
+    <p:sldId id="284" r:id="rId7"/>
+    <p:sldId id="269" r:id="rId8"/>
+    <p:sldId id="271" r:id="rId9"/>
+    <p:sldId id="272" r:id="rId10"/>
+    <p:sldId id="273" r:id="rId11"/>
+    <p:sldId id="275" r:id="rId12"/>
+    <p:sldId id="277" r:id="rId13"/>
+    <p:sldId id="278" r:id="rId14"/>
+    <p:sldId id="279" r:id="rId15"/>
+    <p:sldId id="280" r:id="rId16"/>
   </p:sldIdLst>
   <p:sldSz cx="12192000" cy="6858000"/>
   <p:notesSz cx="6858000" cy="9144000"/>
@@ -272,7 +273,7 @@
           <a:p>
             <a:fld id="{ECFF5693-D71E-4919-B8B6-E582AC32EA67}" type="datetimeFigureOut">
               <a:rPr lang="en-US" smtClean="0"/>
-              <a:t>11/9/2020</a:t>
+              <a:t>11/10/2020</a:t>
             </a:fld>
             <a:endParaRPr lang="en-US"/>
           </a:p>
@@ -470,7 +471,7 @@
           <a:p>
             <a:fld id="{ECFF5693-D71E-4919-B8B6-E582AC32EA67}" type="datetimeFigureOut">
               <a:rPr lang="en-US" smtClean="0"/>
-              <a:t>11/9/2020</a:t>
+              <a:t>11/10/2020</a:t>
             </a:fld>
             <a:endParaRPr lang="en-US"/>
           </a:p>
@@ -678,7 +679,7 @@
           <a:p>
             <a:fld id="{ECFF5693-D71E-4919-B8B6-E582AC32EA67}" type="datetimeFigureOut">
               <a:rPr lang="en-US" smtClean="0"/>
-              <a:t>11/9/2020</a:t>
+              <a:t>11/10/2020</a:t>
             </a:fld>
             <a:endParaRPr lang="en-US"/>
           </a:p>
@@ -876,7 +877,7 @@
           <a:p>
             <a:fld id="{ECFF5693-D71E-4919-B8B6-E582AC32EA67}" type="datetimeFigureOut">
               <a:rPr lang="en-US" smtClean="0"/>
-              <a:t>11/9/2020</a:t>
+              <a:t>11/10/2020</a:t>
             </a:fld>
             <a:endParaRPr lang="en-US"/>
           </a:p>
@@ -1151,7 +1152,7 @@
           <a:p>
             <a:fld id="{ECFF5693-D71E-4919-B8B6-E582AC32EA67}" type="datetimeFigureOut">
               <a:rPr lang="en-US" smtClean="0"/>
-              <a:t>11/9/2020</a:t>
+              <a:t>11/10/2020</a:t>
             </a:fld>
             <a:endParaRPr lang="en-US"/>
           </a:p>
@@ -1416,7 +1417,7 @@
           <a:p>
             <a:fld id="{ECFF5693-D71E-4919-B8B6-E582AC32EA67}" type="datetimeFigureOut">
               <a:rPr lang="en-US" smtClean="0"/>
-              <a:t>11/9/2020</a:t>
+              <a:t>11/10/2020</a:t>
             </a:fld>
             <a:endParaRPr lang="en-US"/>
           </a:p>
@@ -1828,7 +1829,7 @@
           <a:p>
             <a:fld id="{ECFF5693-D71E-4919-B8B6-E582AC32EA67}" type="datetimeFigureOut">
               <a:rPr lang="en-US" smtClean="0"/>
-              <a:t>11/9/2020</a:t>
+              <a:t>11/10/2020</a:t>
             </a:fld>
             <a:endParaRPr lang="en-US"/>
           </a:p>
@@ -1969,7 +1970,7 @@
           <a:p>
             <a:fld id="{ECFF5693-D71E-4919-B8B6-E582AC32EA67}" type="datetimeFigureOut">
               <a:rPr lang="en-US" smtClean="0"/>
-              <a:t>11/9/2020</a:t>
+              <a:t>11/10/2020</a:t>
             </a:fld>
             <a:endParaRPr lang="en-US"/>
           </a:p>
@@ -2082,7 +2083,7 @@
           <a:p>
             <a:fld id="{ECFF5693-D71E-4919-B8B6-E582AC32EA67}" type="datetimeFigureOut">
               <a:rPr lang="en-US" smtClean="0"/>
-              <a:t>11/9/2020</a:t>
+              <a:t>11/10/2020</a:t>
             </a:fld>
             <a:endParaRPr lang="en-US"/>
           </a:p>
@@ -2393,7 +2394,7 @@
           <a:p>
             <a:fld id="{ECFF5693-D71E-4919-B8B6-E582AC32EA67}" type="datetimeFigureOut">
               <a:rPr lang="en-US" smtClean="0"/>
-              <a:t>11/9/2020</a:t>
+              <a:t>11/10/2020</a:t>
             </a:fld>
             <a:endParaRPr lang="en-US"/>
           </a:p>
@@ -2681,7 +2682,7 @@
           <a:p>
             <a:fld id="{ECFF5693-D71E-4919-B8B6-E582AC32EA67}" type="datetimeFigureOut">
               <a:rPr lang="en-US" smtClean="0"/>
-              <a:t>11/9/2020</a:t>
+              <a:t>11/10/2020</a:t>
             </a:fld>
             <a:endParaRPr lang="en-US"/>
           </a:p>
@@ -2922,7 +2923,7 @@
           <a:p>
             <a:fld id="{ECFF5693-D71E-4919-B8B6-E582AC32EA67}" type="datetimeFigureOut">
               <a:rPr lang="en-US" smtClean="0"/>
-              <a:t>11/9/2020</a:t>
+              <a:t>11/10/2020</a:t>
             </a:fld>
             <a:endParaRPr lang="en-US"/>
           </a:p>
@@ -3429,7 +3430,7 @@
             <a:pPr algn="l"/>
             <a:r>
               <a:rPr lang="en-US" sz="2000" dirty="0"/>
-              <a:t>November 6, 2020</a:t>
+              <a:t>November 10, 2020</a:t>
             </a:r>
           </a:p>
         </p:txBody>
@@ -4104,6 +4105,290 @@
           </a:bodyPr>
           <a:lstStyle/>
           <a:p>
+            <a:r>
+              <a:rPr lang="en-US" sz="1800" dirty="0"/>
+              <a:t>List the manager of each department with the following information: </a:t>
+            </a:r>
+            <a:br>
+              <a:rPr lang="en-US" sz="1800" dirty="0"/>
+            </a:br>
+            <a:r>
+              <a:rPr lang="en-US" sz="1800" dirty="0"/>
+              <a:t>department number, department name, the manager's employee number, last name, first name.</a:t>
+            </a:r>
+          </a:p>
+        </p:txBody>
+      </p:sp>
+      <p:pic>
+        <p:nvPicPr>
+          <p:cNvPr id="4" name="Picture 3">
+            <a:extLst>
+              <a:ext uri="{FF2B5EF4-FFF2-40B4-BE49-F238E27FC236}">
+                <a16:creationId xmlns:a16="http://schemas.microsoft.com/office/drawing/2014/main" id="{0D0AA618-F327-4246-9DC9-EFA096DD1043}"/>
+              </a:ext>
+            </a:extLst>
+          </p:cNvPr>
+          <p:cNvPicPr>
+            <a:picLocks noChangeAspect="1"/>
+          </p:cNvPicPr>
+          <p:nvPr/>
+        </p:nvPicPr>
+        <p:blipFill>
+          <a:blip r:embed="rId2"/>
+          <a:stretch>
+            <a:fillRect/>
+          </a:stretch>
+        </p:blipFill>
+        <p:spPr>
+          <a:xfrm>
+            <a:off x="1524000" y="1476375"/>
+            <a:ext cx="9144000" cy="5143500"/>
+          </a:xfrm>
+          <a:prstGeom prst="rect">
+            <a:avLst/>
+          </a:prstGeom>
+        </p:spPr>
+      </p:pic>
+    </p:spTree>
+    <p:extLst>
+      <p:ext uri="{BB962C8B-B14F-4D97-AF65-F5344CB8AC3E}">
+        <p14:creationId xmlns:p14="http://schemas.microsoft.com/office/powerpoint/2010/main" val="3332624021"/>
+      </p:ext>
+    </p:extLst>
+  </p:cSld>
+  <p:clrMapOvr>
+    <a:masterClrMapping/>
+  </p:clrMapOvr>
+</p:sld>
+</file>
+
+<file path=ppt/slides/slide11.xml><?xml version="1.0" encoding="utf-8"?>
+<p:sld xmlns:a="http://schemas.openxmlformats.org/drawingml/2006/main" xmlns:r="http://schemas.openxmlformats.org/officeDocument/2006/relationships" xmlns:p="http://schemas.openxmlformats.org/presentationml/2006/main">
+  <p:cSld>
+    <p:spTree>
+      <p:nvGrpSpPr>
+        <p:cNvPr id="1" name=""/>
+        <p:cNvGrpSpPr/>
+        <p:nvPr/>
+      </p:nvGrpSpPr>
+      <p:grpSpPr>
+        <a:xfrm>
+          <a:off x="0" y="0"/>
+          <a:ext cx="0" cy="0"/>
+          <a:chOff x="0" y="0"/>
+          <a:chExt cx="0" cy="0"/>
+        </a:xfrm>
+      </p:grpSpPr>
+      <p:sp>
+        <p:nvSpPr>
+          <p:cNvPr id="2" name="Title 1">
+            <a:extLst>
+              <a:ext uri="{FF2B5EF4-FFF2-40B4-BE49-F238E27FC236}">
+                <a16:creationId xmlns:a16="http://schemas.microsoft.com/office/drawing/2014/main" id="{20588642-DFFB-4D20-A52B-0ABA4364BA9B}"/>
+              </a:ext>
+            </a:extLst>
+          </p:cNvPr>
+          <p:cNvSpPr>
+            <a:spLocks noGrp="1"/>
+          </p:cNvSpPr>
+          <p:nvPr>
+            <p:ph type="title"/>
+          </p:nvPr>
+        </p:nvSpPr>
+        <p:spPr/>
+        <p:txBody>
+          <a:bodyPr>
+            <a:normAutofit/>
+          </a:bodyPr>
+          <a:lstStyle/>
+          <a:p>
+            <a:r>
+              <a:rPr lang="en-US" sz="1800" dirty="0"/>
+              <a:t>List the department of each employee with the following information: </a:t>
+            </a:r>
+            <a:br>
+              <a:rPr lang="en-US" sz="1800" dirty="0"/>
+            </a:br>
+            <a:r>
+              <a:rPr lang="en-US" sz="1800" dirty="0"/>
+              <a:t>employee number, last name, first name, and department name.</a:t>
+            </a:r>
+          </a:p>
+        </p:txBody>
+      </p:sp>
+      <p:pic>
+        <p:nvPicPr>
+          <p:cNvPr id="4" name="Picture 3">
+            <a:extLst>
+              <a:ext uri="{FF2B5EF4-FFF2-40B4-BE49-F238E27FC236}">
+                <a16:creationId xmlns:a16="http://schemas.microsoft.com/office/drawing/2014/main" id="{120BA9A5-0050-4886-BBED-E23ED6BA461E}"/>
+              </a:ext>
+            </a:extLst>
+          </p:cNvPr>
+          <p:cNvPicPr>
+            <a:picLocks noChangeAspect="1"/>
+          </p:cNvPicPr>
+          <p:nvPr/>
+        </p:nvPicPr>
+        <p:blipFill>
+          <a:blip r:embed="rId2"/>
+          <a:stretch>
+            <a:fillRect/>
+          </a:stretch>
+        </p:blipFill>
+        <p:spPr>
+          <a:xfrm>
+            <a:off x="1524000" y="1495425"/>
+            <a:ext cx="9144000" cy="5143500"/>
+          </a:xfrm>
+          <a:prstGeom prst="rect">
+            <a:avLst/>
+          </a:prstGeom>
+        </p:spPr>
+      </p:pic>
+    </p:spTree>
+    <p:extLst>
+      <p:ext uri="{BB962C8B-B14F-4D97-AF65-F5344CB8AC3E}">
+        <p14:creationId xmlns:p14="http://schemas.microsoft.com/office/powerpoint/2010/main" val="826534142"/>
+      </p:ext>
+    </p:extLst>
+  </p:cSld>
+  <p:clrMapOvr>
+    <a:masterClrMapping/>
+  </p:clrMapOvr>
+</p:sld>
+</file>
+
+<file path=ppt/slides/slide12.xml><?xml version="1.0" encoding="utf-8"?>
+<p:sld xmlns:a="http://schemas.openxmlformats.org/drawingml/2006/main" xmlns:r="http://schemas.openxmlformats.org/officeDocument/2006/relationships" xmlns:p="http://schemas.openxmlformats.org/presentationml/2006/main">
+  <p:cSld>
+    <p:spTree>
+      <p:nvGrpSpPr>
+        <p:cNvPr id="1" name=""/>
+        <p:cNvGrpSpPr/>
+        <p:nvPr/>
+      </p:nvGrpSpPr>
+      <p:grpSpPr>
+        <a:xfrm>
+          <a:off x="0" y="0"/>
+          <a:ext cx="0" cy="0"/>
+          <a:chOff x="0" y="0"/>
+          <a:chExt cx="0" cy="0"/>
+        </a:xfrm>
+      </p:grpSpPr>
+      <p:sp>
+        <p:nvSpPr>
+          <p:cNvPr id="2" name="Title 1">
+            <a:extLst>
+              <a:ext uri="{FF2B5EF4-FFF2-40B4-BE49-F238E27FC236}">
+                <a16:creationId xmlns:a16="http://schemas.microsoft.com/office/drawing/2014/main" id="{20588642-DFFB-4D20-A52B-0ABA4364BA9B}"/>
+              </a:ext>
+            </a:extLst>
+          </p:cNvPr>
+          <p:cNvSpPr>
+            <a:spLocks noGrp="1"/>
+          </p:cNvSpPr>
+          <p:nvPr>
+            <p:ph type="title"/>
+          </p:nvPr>
+        </p:nvSpPr>
+        <p:spPr/>
+        <p:txBody>
+          <a:bodyPr>
+            <a:normAutofit/>
+          </a:bodyPr>
+          <a:lstStyle/>
+          <a:p>
+            <a:r>
+              <a:rPr lang="en-US" sz="1800" dirty="0"/>
+              <a:t>List first name, last name, and sex for employees whose first name is "Hercules" and last names begin with "B."</a:t>
+            </a:r>
+          </a:p>
+        </p:txBody>
+      </p:sp>
+      <p:pic>
+        <p:nvPicPr>
+          <p:cNvPr id="4" name="Picture 3">
+            <a:extLst>
+              <a:ext uri="{FF2B5EF4-FFF2-40B4-BE49-F238E27FC236}">
+                <a16:creationId xmlns:a16="http://schemas.microsoft.com/office/drawing/2014/main" id="{3D77C085-6527-4E86-9BD7-ADFB432C504C}"/>
+              </a:ext>
+            </a:extLst>
+          </p:cNvPr>
+          <p:cNvPicPr>
+            <a:picLocks noChangeAspect="1"/>
+          </p:cNvPicPr>
+          <p:nvPr/>
+        </p:nvPicPr>
+        <p:blipFill>
+          <a:blip r:embed="rId2"/>
+          <a:stretch>
+            <a:fillRect/>
+          </a:stretch>
+        </p:blipFill>
+        <p:spPr>
+          <a:xfrm>
+            <a:off x="1409700" y="1533525"/>
+            <a:ext cx="9144000" cy="5143500"/>
+          </a:xfrm>
+          <a:prstGeom prst="rect">
+            <a:avLst/>
+          </a:prstGeom>
+        </p:spPr>
+      </p:pic>
+    </p:spTree>
+    <p:extLst>
+      <p:ext uri="{BB962C8B-B14F-4D97-AF65-F5344CB8AC3E}">
+        <p14:creationId xmlns:p14="http://schemas.microsoft.com/office/powerpoint/2010/main" val="297949430"/>
+      </p:ext>
+    </p:extLst>
+  </p:cSld>
+  <p:clrMapOvr>
+    <a:masterClrMapping/>
+  </p:clrMapOvr>
+</p:sld>
+</file>
+
+<file path=ppt/slides/slide13.xml><?xml version="1.0" encoding="utf-8"?>
+<p:sld xmlns:a="http://schemas.openxmlformats.org/drawingml/2006/main" xmlns:r="http://schemas.openxmlformats.org/officeDocument/2006/relationships" xmlns:p="http://schemas.openxmlformats.org/presentationml/2006/main">
+  <p:cSld>
+    <p:spTree>
+      <p:nvGrpSpPr>
+        <p:cNvPr id="1" name=""/>
+        <p:cNvGrpSpPr/>
+        <p:nvPr/>
+      </p:nvGrpSpPr>
+      <p:grpSpPr>
+        <a:xfrm>
+          <a:off x="0" y="0"/>
+          <a:ext cx="0" cy="0"/>
+          <a:chOff x="0" y="0"/>
+          <a:chExt cx="0" cy="0"/>
+        </a:xfrm>
+      </p:grpSpPr>
+      <p:sp>
+        <p:nvSpPr>
+          <p:cNvPr id="2" name="Title 1">
+            <a:extLst>
+              <a:ext uri="{FF2B5EF4-FFF2-40B4-BE49-F238E27FC236}">
+                <a16:creationId xmlns:a16="http://schemas.microsoft.com/office/drawing/2014/main" id="{20588642-DFFB-4D20-A52B-0ABA4364BA9B}"/>
+              </a:ext>
+            </a:extLst>
+          </p:cNvPr>
+          <p:cNvSpPr>
+            <a:spLocks noGrp="1"/>
+          </p:cNvSpPr>
+          <p:nvPr>
+            <p:ph type="title"/>
+          </p:nvPr>
+        </p:nvSpPr>
+        <p:spPr/>
+        <p:txBody>
+          <a:bodyPr>
+            <a:normAutofit/>
+          </a:bodyPr>
+          <a:lstStyle/>
+          <a:p>
             <a:pPr marL="457200" marR="0" lvl="1">
               <a:lnSpc>
                 <a:spcPct val="107000"/>
@@ -4187,7 +4472,7 @@
 </p:sld>
 </file>
 
-<file path=ppt/slides/slide11.xml><?xml version="1.0" encoding="utf-8"?>
+<file path=ppt/slides/slide14.xml><?xml version="1.0" encoding="utf-8"?>
 <p:sld xmlns:a="http://schemas.openxmlformats.org/drawingml/2006/main" xmlns:r="http://schemas.openxmlformats.org/officeDocument/2006/relationships" xmlns:p="http://schemas.openxmlformats.org/presentationml/2006/main">
   <p:cSld>
     <p:spTree>
@@ -4277,7 +4562,7 @@
 </p:sld>
 </file>
 
-<file path=ppt/slides/slide12.xml><?xml version="1.0" encoding="utf-8"?>
+<file path=ppt/slides/slide15.xml><?xml version="1.0" encoding="utf-8"?>
 <p:sld xmlns:a="http://schemas.openxmlformats.org/drawingml/2006/main" xmlns:r="http://schemas.openxmlformats.org/officeDocument/2006/relationships" xmlns:p="http://schemas.openxmlformats.org/presentationml/2006/main">
   <p:cSld>
     <p:spTree>
@@ -4365,149 +4650,6 @@
     <p:extLst>
       <p:ext uri="{BB962C8B-B14F-4D97-AF65-F5344CB8AC3E}">
         <p14:creationId xmlns:p14="http://schemas.microsoft.com/office/powerpoint/2010/main" val="1748868115"/>
-      </p:ext>
-    </p:extLst>
-  </p:cSld>
-  <p:clrMapOvr>
-    <a:masterClrMapping/>
-  </p:clrMapOvr>
-</p:sld>
-</file>
-
-<file path=ppt/slides/slide13.xml><?xml version="1.0" encoding="utf-8"?>
-<p:sld xmlns:a="http://schemas.openxmlformats.org/drawingml/2006/main" xmlns:r="http://schemas.openxmlformats.org/officeDocument/2006/relationships" xmlns:p="http://schemas.openxmlformats.org/presentationml/2006/main">
-  <p:cSld>
-    <p:spTree>
-      <p:nvGrpSpPr>
-        <p:cNvPr id="1" name=""/>
-        <p:cNvGrpSpPr/>
-        <p:nvPr/>
-      </p:nvGrpSpPr>
-      <p:grpSpPr>
-        <a:xfrm>
-          <a:off x="0" y="0"/>
-          <a:ext cx="0" cy="0"/>
-          <a:chOff x="0" y="0"/>
-          <a:chExt cx="0" cy="0"/>
-        </a:xfrm>
-      </p:grpSpPr>
-      <p:sp>
-        <p:nvSpPr>
-          <p:cNvPr id="2" name="Title 1">
-            <a:extLst>
-              <a:ext uri="{FF2B5EF4-FFF2-40B4-BE49-F238E27FC236}">
-                <a16:creationId xmlns:a16="http://schemas.microsoft.com/office/drawing/2014/main" id="{6FF97B43-4506-43C3-9E44-F210E5978300}"/>
-              </a:ext>
-            </a:extLst>
-          </p:cNvPr>
-          <p:cNvSpPr>
-            <a:spLocks noGrp="1"/>
-          </p:cNvSpPr>
-          <p:nvPr>
-            <p:ph type="ctrTitle"/>
-          </p:nvPr>
-        </p:nvSpPr>
-        <p:spPr/>
-        <p:txBody>
-          <a:bodyPr/>
-          <a:lstStyle/>
-          <a:p>
-            <a:r>
-              <a:rPr lang="en-US" dirty="0"/>
-              <a:t>Bonus Challenge</a:t>
-            </a:r>
-          </a:p>
-        </p:txBody>
-      </p:sp>
-      <p:sp>
-        <p:nvSpPr>
-          <p:cNvPr id="3" name="Subtitle 2">
-            <a:extLst>
-              <a:ext uri="{FF2B5EF4-FFF2-40B4-BE49-F238E27FC236}">
-                <a16:creationId xmlns:a16="http://schemas.microsoft.com/office/drawing/2014/main" id="{8ACC9DD0-8D00-4F83-B504-6B22188486EB}"/>
-              </a:ext>
-            </a:extLst>
-          </p:cNvPr>
-          <p:cNvSpPr>
-            <a:spLocks noGrp="1"/>
-          </p:cNvSpPr>
-          <p:nvPr>
-            <p:ph type="subTitle" idx="1"/>
-          </p:nvPr>
-        </p:nvSpPr>
-        <p:spPr/>
-        <p:txBody>
-          <a:bodyPr/>
-          <a:lstStyle/>
-          <a:p>
-            <a:endParaRPr lang="en-US"/>
-          </a:p>
-        </p:txBody>
-      </p:sp>
-    </p:spTree>
-    <p:extLst>
-      <p:ext uri="{BB962C8B-B14F-4D97-AF65-F5344CB8AC3E}">
-        <p14:creationId xmlns:p14="http://schemas.microsoft.com/office/powerpoint/2010/main" val="1120152822"/>
-      </p:ext>
-    </p:extLst>
-  </p:cSld>
-  <p:clrMapOvr>
-    <a:masterClrMapping/>
-  </p:clrMapOvr>
-</p:sld>
-</file>
-
-<file path=ppt/slides/slide14.xml><?xml version="1.0" encoding="utf-8"?>
-<p:sld xmlns:a="http://schemas.openxmlformats.org/drawingml/2006/main" xmlns:r="http://schemas.openxmlformats.org/officeDocument/2006/relationships" xmlns:p="http://schemas.openxmlformats.org/presentationml/2006/main">
-  <p:cSld>
-    <p:spTree>
-      <p:nvGrpSpPr>
-        <p:cNvPr id="1" name=""/>
-        <p:cNvGrpSpPr/>
-        <p:nvPr/>
-      </p:nvGrpSpPr>
-      <p:grpSpPr>
-        <a:xfrm>
-          <a:off x="0" y="0"/>
-          <a:ext cx="0" cy="0"/>
-          <a:chOff x="0" y="0"/>
-          <a:chExt cx="0" cy="0"/>
-        </a:xfrm>
-      </p:grpSpPr>
-      <p:sp>
-        <p:nvSpPr>
-          <p:cNvPr id="2" name="Title 1">
-            <a:extLst>
-              <a:ext uri="{FF2B5EF4-FFF2-40B4-BE49-F238E27FC236}">
-                <a16:creationId xmlns:a16="http://schemas.microsoft.com/office/drawing/2014/main" id="{20588642-DFFB-4D20-A52B-0ABA4364BA9B}"/>
-              </a:ext>
-            </a:extLst>
-          </p:cNvPr>
-          <p:cNvSpPr>
-            <a:spLocks noGrp="1"/>
-          </p:cNvSpPr>
-          <p:nvPr>
-            <p:ph type="title"/>
-          </p:nvPr>
-        </p:nvSpPr>
-        <p:spPr/>
-        <p:txBody>
-          <a:bodyPr>
-            <a:normAutofit/>
-          </a:bodyPr>
-          <a:lstStyle/>
-          <a:p>
-            <a:r>
-              <a:rPr lang="en-US" sz="1800" dirty="0"/>
-              <a:t>xxx.</a:t>
-            </a:r>
-          </a:p>
-        </p:txBody>
-      </p:sp>
-    </p:spTree>
-    <p:extLst>
-      <p:ext uri="{BB962C8B-B14F-4D97-AF65-F5344CB8AC3E}">
-        <p14:creationId xmlns:p14="http://schemas.microsoft.com/office/powerpoint/2010/main" val="1549624611"/>
       </p:ext>
     </p:extLst>
   </p:cSld>
@@ -4713,6 +4855,270 @@
           <p:cNvPr id="2" name="Title 1">
             <a:extLst>
               <a:ext uri="{FF2B5EF4-FFF2-40B4-BE49-F238E27FC236}">
+                <a16:creationId xmlns:a16="http://schemas.microsoft.com/office/drawing/2014/main" id="{005DFF38-8AE5-4C43-ABEF-332AD8976E2F}"/>
+              </a:ext>
+            </a:extLst>
+          </p:cNvPr>
+          <p:cNvSpPr>
+            <a:spLocks noGrp="1"/>
+          </p:cNvSpPr>
+          <p:nvPr>
+            <p:ph type="title"/>
+          </p:nvPr>
+        </p:nvSpPr>
+        <p:spPr/>
+        <p:txBody>
+          <a:bodyPr/>
+          <a:lstStyle/>
+          <a:p>
+            <a:r>
+              <a:rPr lang="en-US" dirty="0"/>
+              <a:t>Rodgers SQL-Challenge </a:t>
+            </a:r>
+          </a:p>
+        </p:txBody>
+      </p:sp>
+      <p:sp>
+        <p:nvSpPr>
+          <p:cNvPr id="3" name="Text Placeholder 2">
+            <a:extLst>
+              <a:ext uri="{FF2B5EF4-FFF2-40B4-BE49-F238E27FC236}">
+                <a16:creationId xmlns:a16="http://schemas.microsoft.com/office/drawing/2014/main" id="{B19BF0BA-C78B-43B6-884F-AFCF2DABB47B}"/>
+              </a:ext>
+            </a:extLst>
+          </p:cNvPr>
+          <p:cNvSpPr>
+            <a:spLocks noGrp="1"/>
+          </p:cNvSpPr>
+          <p:nvPr>
+            <p:ph type="body" idx="1"/>
+          </p:nvPr>
+        </p:nvSpPr>
+        <p:spPr/>
+        <p:txBody>
+          <a:bodyPr/>
+          <a:lstStyle/>
+          <a:p>
+            <a:r>
+              <a:rPr lang="en-US" dirty="0"/>
+              <a:t>Bonus Exhibits</a:t>
+            </a:r>
+          </a:p>
+        </p:txBody>
+      </p:sp>
+    </p:spTree>
+    <p:extLst>
+      <p:ext uri="{BB962C8B-B14F-4D97-AF65-F5344CB8AC3E}">
+        <p14:creationId xmlns:p14="http://schemas.microsoft.com/office/powerpoint/2010/main" val="2471772294"/>
+      </p:ext>
+    </p:extLst>
+  </p:cSld>
+  <p:clrMapOvr>
+    <a:masterClrMapping/>
+  </p:clrMapOvr>
+</p:sld>
+</file>
+
+<file path=ppt/slides/slide5.xml><?xml version="1.0" encoding="utf-8"?>
+<p:sld xmlns:a="http://schemas.openxmlformats.org/drawingml/2006/main" xmlns:r="http://schemas.openxmlformats.org/officeDocument/2006/relationships" xmlns:p="http://schemas.openxmlformats.org/presentationml/2006/main">
+  <p:cSld>
+    <p:spTree>
+      <p:nvGrpSpPr>
+        <p:cNvPr id="1" name=""/>
+        <p:cNvGrpSpPr/>
+        <p:nvPr/>
+      </p:nvGrpSpPr>
+      <p:grpSpPr>
+        <a:xfrm>
+          <a:off x="0" y="0"/>
+          <a:ext cx="0" cy="0"/>
+          <a:chOff x="0" y="0"/>
+          <a:chExt cx="0" cy="0"/>
+        </a:xfrm>
+      </p:grpSpPr>
+      <p:sp>
+        <p:nvSpPr>
+          <p:cNvPr id="2" name="Title 1">
+            <a:extLst>
+              <a:ext uri="{FF2B5EF4-FFF2-40B4-BE49-F238E27FC236}">
+                <a16:creationId xmlns:a16="http://schemas.microsoft.com/office/drawing/2014/main" id="{20588642-DFFB-4D20-A52B-0ABA4364BA9B}"/>
+              </a:ext>
+            </a:extLst>
+          </p:cNvPr>
+          <p:cNvSpPr>
+            <a:spLocks noGrp="1"/>
+          </p:cNvSpPr>
+          <p:nvPr>
+            <p:ph type="title"/>
+          </p:nvPr>
+        </p:nvSpPr>
+        <p:spPr/>
+        <p:txBody>
+          <a:bodyPr>
+            <a:normAutofit/>
+          </a:bodyPr>
+          <a:lstStyle/>
+          <a:p>
+            <a:r>
+              <a:rPr lang="en-US" sz="1800" dirty="0"/>
+              <a:t>Create a histogram to visualize the most common salary ranges for employees.</a:t>
+            </a:r>
+          </a:p>
+        </p:txBody>
+      </p:sp>
+      <p:pic>
+        <p:nvPicPr>
+          <p:cNvPr id="5" name="Picture 4">
+            <a:extLst>
+              <a:ext uri="{FF2B5EF4-FFF2-40B4-BE49-F238E27FC236}">
+                <a16:creationId xmlns:a16="http://schemas.microsoft.com/office/drawing/2014/main" id="{F80FBE88-C599-4EC9-B588-BA3B9A2D6394}"/>
+              </a:ext>
+            </a:extLst>
+          </p:cNvPr>
+          <p:cNvPicPr>
+            <a:picLocks noChangeAspect="1"/>
+          </p:cNvPicPr>
+          <p:nvPr/>
+        </p:nvPicPr>
+        <p:blipFill rotWithShape="1">
+          <a:blip r:embed="rId2"/>
+          <a:srcRect l="20898" t="48285" r="51214" b="21035"/>
+          <a:stretch/>
+        </p:blipFill>
+        <p:spPr>
+          <a:xfrm>
+            <a:off x="2361460" y="1690688"/>
+            <a:ext cx="6880194" cy="4257456"/>
+          </a:xfrm>
+          <a:prstGeom prst="rect">
+            <a:avLst/>
+          </a:prstGeom>
+        </p:spPr>
+      </p:pic>
+    </p:spTree>
+    <p:extLst>
+      <p:ext uri="{BB962C8B-B14F-4D97-AF65-F5344CB8AC3E}">
+        <p14:creationId xmlns:p14="http://schemas.microsoft.com/office/powerpoint/2010/main" val="825378282"/>
+      </p:ext>
+    </p:extLst>
+  </p:cSld>
+  <p:clrMapOvr>
+    <a:masterClrMapping/>
+  </p:clrMapOvr>
+</p:sld>
+</file>
+
+<file path=ppt/slides/slide6.xml><?xml version="1.0" encoding="utf-8"?>
+<p:sld xmlns:a="http://schemas.openxmlformats.org/drawingml/2006/main" xmlns:r="http://schemas.openxmlformats.org/officeDocument/2006/relationships" xmlns:p="http://schemas.openxmlformats.org/presentationml/2006/main">
+  <p:cSld>
+    <p:spTree>
+      <p:nvGrpSpPr>
+        <p:cNvPr id="1" name=""/>
+        <p:cNvGrpSpPr/>
+        <p:nvPr/>
+      </p:nvGrpSpPr>
+      <p:grpSpPr>
+        <a:xfrm>
+          <a:off x="0" y="0"/>
+          <a:ext cx="0" cy="0"/>
+          <a:chOff x="0" y="0"/>
+          <a:chExt cx="0" cy="0"/>
+        </a:xfrm>
+      </p:grpSpPr>
+      <p:sp>
+        <p:nvSpPr>
+          <p:cNvPr id="2" name="Title 1">
+            <a:extLst>
+              <a:ext uri="{FF2B5EF4-FFF2-40B4-BE49-F238E27FC236}">
+                <a16:creationId xmlns:a16="http://schemas.microsoft.com/office/drawing/2014/main" id="{20588642-DFFB-4D20-A52B-0ABA4364BA9B}"/>
+              </a:ext>
+            </a:extLst>
+          </p:cNvPr>
+          <p:cNvSpPr>
+            <a:spLocks noGrp="1"/>
+          </p:cNvSpPr>
+          <p:nvPr>
+            <p:ph type="title"/>
+          </p:nvPr>
+        </p:nvSpPr>
+        <p:spPr/>
+        <p:txBody>
+          <a:bodyPr>
+            <a:normAutofit/>
+          </a:bodyPr>
+          <a:lstStyle/>
+          <a:p>
+            <a:r>
+              <a:rPr lang="en-US" sz="1800" dirty="0"/>
+              <a:t>Create a bar chart of average salary by title</a:t>
+            </a:r>
+          </a:p>
+        </p:txBody>
+      </p:sp>
+      <p:pic>
+        <p:nvPicPr>
+          <p:cNvPr id="5" name="Picture 4">
+            <a:extLst>
+              <a:ext uri="{FF2B5EF4-FFF2-40B4-BE49-F238E27FC236}">
+                <a16:creationId xmlns:a16="http://schemas.microsoft.com/office/drawing/2014/main" id="{4C8F7A9D-8419-47F6-A2EB-274551B4CD57}"/>
+              </a:ext>
+            </a:extLst>
+          </p:cNvPr>
+          <p:cNvPicPr>
+            <a:picLocks noChangeAspect="1"/>
+          </p:cNvPicPr>
+          <p:nvPr/>
+        </p:nvPicPr>
+        <p:blipFill rotWithShape="1">
+          <a:blip r:embed="rId2"/>
+          <a:srcRect l="20777" t="43883" r="13835" b="26343"/>
+          <a:stretch/>
+        </p:blipFill>
+        <p:spPr>
+          <a:xfrm>
+            <a:off x="654143" y="2423604"/>
+            <a:ext cx="10883714" cy="2787588"/>
+          </a:xfrm>
+          <a:prstGeom prst="rect">
+            <a:avLst/>
+          </a:prstGeom>
+        </p:spPr>
+      </p:pic>
+    </p:spTree>
+    <p:extLst>
+      <p:ext uri="{BB962C8B-B14F-4D97-AF65-F5344CB8AC3E}">
+        <p14:creationId xmlns:p14="http://schemas.microsoft.com/office/powerpoint/2010/main" val="517561545"/>
+      </p:ext>
+    </p:extLst>
+  </p:cSld>
+  <p:clrMapOvr>
+    <a:masterClrMapping/>
+  </p:clrMapOvr>
+</p:sld>
+</file>
+
+<file path=ppt/slides/slide7.xml><?xml version="1.0" encoding="utf-8"?>
+<p:sld xmlns:a="http://schemas.openxmlformats.org/drawingml/2006/main" xmlns:r="http://schemas.openxmlformats.org/officeDocument/2006/relationships" xmlns:p="http://schemas.openxmlformats.org/presentationml/2006/main">
+  <p:cSld>
+    <p:spTree>
+      <p:nvGrpSpPr>
+        <p:cNvPr id="1" name=""/>
+        <p:cNvGrpSpPr/>
+        <p:nvPr/>
+      </p:nvGrpSpPr>
+      <p:grpSpPr>
+        <a:xfrm>
+          <a:off x="0" y="0"/>
+          <a:ext cx="0" cy="0"/>
+          <a:chOff x="0" y="0"/>
+          <a:chExt cx="0" cy="0"/>
+        </a:xfrm>
+      </p:grpSpPr>
+      <p:sp>
+        <p:nvSpPr>
+          <p:cNvPr id="2" name="Title 1">
+            <a:extLst>
+              <a:ext uri="{FF2B5EF4-FFF2-40B4-BE49-F238E27FC236}">
                 <a16:creationId xmlns:a16="http://schemas.microsoft.com/office/drawing/2014/main" id="{8EA160D4-3CAF-4493-87F6-C2750C25E290}"/>
               </a:ext>
             </a:extLst>
@@ -4777,7 +5183,7 @@
 </p:sld>
 </file>
 
-<file path=ppt/slides/slide5.xml><?xml version="1.0" encoding="utf-8"?>
+<file path=ppt/slides/slide8.xml><?xml version="1.0" encoding="utf-8"?>
 <p:sld xmlns:a="http://schemas.openxmlformats.org/drawingml/2006/main" xmlns:r="http://schemas.openxmlformats.org/officeDocument/2006/relationships" xmlns:p="http://schemas.openxmlformats.org/presentationml/2006/main">
   <p:cSld>
     <p:spTree>
@@ -4867,7 +5273,7 @@
 </p:sld>
 </file>
 
-<file path=ppt/slides/slide6.xml><?xml version="1.0" encoding="utf-8"?>
+<file path=ppt/slides/slide9.xml><?xml version="1.0" encoding="utf-8"?>
 <p:sld xmlns:a="http://schemas.openxmlformats.org/drawingml/2006/main" xmlns:r="http://schemas.openxmlformats.org/officeDocument/2006/relationships" xmlns:p="http://schemas.openxmlformats.org/presentationml/2006/main">
   <p:cSld>
     <p:spTree>
@@ -4948,290 +5354,6 @@
     <p:extLst>
       <p:ext uri="{BB962C8B-B14F-4D97-AF65-F5344CB8AC3E}">
         <p14:creationId xmlns:p14="http://schemas.microsoft.com/office/powerpoint/2010/main" val="1762867825"/>
-      </p:ext>
-    </p:extLst>
-  </p:cSld>
-  <p:clrMapOvr>
-    <a:masterClrMapping/>
-  </p:clrMapOvr>
-</p:sld>
-</file>
-
-<file path=ppt/slides/slide7.xml><?xml version="1.0" encoding="utf-8"?>
-<p:sld xmlns:a="http://schemas.openxmlformats.org/drawingml/2006/main" xmlns:r="http://schemas.openxmlformats.org/officeDocument/2006/relationships" xmlns:p="http://schemas.openxmlformats.org/presentationml/2006/main">
-  <p:cSld>
-    <p:spTree>
-      <p:nvGrpSpPr>
-        <p:cNvPr id="1" name=""/>
-        <p:cNvGrpSpPr/>
-        <p:nvPr/>
-      </p:nvGrpSpPr>
-      <p:grpSpPr>
-        <a:xfrm>
-          <a:off x="0" y="0"/>
-          <a:ext cx="0" cy="0"/>
-          <a:chOff x="0" y="0"/>
-          <a:chExt cx="0" cy="0"/>
-        </a:xfrm>
-      </p:grpSpPr>
-      <p:sp>
-        <p:nvSpPr>
-          <p:cNvPr id="2" name="Title 1">
-            <a:extLst>
-              <a:ext uri="{FF2B5EF4-FFF2-40B4-BE49-F238E27FC236}">
-                <a16:creationId xmlns:a16="http://schemas.microsoft.com/office/drawing/2014/main" id="{20588642-DFFB-4D20-A52B-0ABA4364BA9B}"/>
-              </a:ext>
-            </a:extLst>
-          </p:cNvPr>
-          <p:cNvSpPr>
-            <a:spLocks noGrp="1"/>
-          </p:cNvSpPr>
-          <p:nvPr>
-            <p:ph type="title"/>
-          </p:nvPr>
-        </p:nvSpPr>
-        <p:spPr/>
-        <p:txBody>
-          <a:bodyPr>
-            <a:normAutofit/>
-          </a:bodyPr>
-          <a:lstStyle/>
-          <a:p>
-            <a:r>
-              <a:rPr lang="en-US" sz="1800" dirty="0"/>
-              <a:t>List the manager of each department with the following information: </a:t>
-            </a:r>
-            <a:br>
-              <a:rPr lang="en-US" sz="1800" dirty="0"/>
-            </a:br>
-            <a:r>
-              <a:rPr lang="en-US" sz="1800" dirty="0"/>
-              <a:t>department number, department name, the manager's employee number, last name, first name.</a:t>
-            </a:r>
-          </a:p>
-        </p:txBody>
-      </p:sp>
-      <p:pic>
-        <p:nvPicPr>
-          <p:cNvPr id="4" name="Picture 3">
-            <a:extLst>
-              <a:ext uri="{FF2B5EF4-FFF2-40B4-BE49-F238E27FC236}">
-                <a16:creationId xmlns:a16="http://schemas.microsoft.com/office/drawing/2014/main" id="{0D0AA618-F327-4246-9DC9-EFA096DD1043}"/>
-              </a:ext>
-            </a:extLst>
-          </p:cNvPr>
-          <p:cNvPicPr>
-            <a:picLocks noChangeAspect="1"/>
-          </p:cNvPicPr>
-          <p:nvPr/>
-        </p:nvPicPr>
-        <p:blipFill>
-          <a:blip r:embed="rId2"/>
-          <a:stretch>
-            <a:fillRect/>
-          </a:stretch>
-        </p:blipFill>
-        <p:spPr>
-          <a:xfrm>
-            <a:off x="1524000" y="1476375"/>
-            <a:ext cx="9144000" cy="5143500"/>
-          </a:xfrm>
-          <a:prstGeom prst="rect">
-            <a:avLst/>
-          </a:prstGeom>
-        </p:spPr>
-      </p:pic>
-    </p:spTree>
-    <p:extLst>
-      <p:ext uri="{BB962C8B-B14F-4D97-AF65-F5344CB8AC3E}">
-        <p14:creationId xmlns:p14="http://schemas.microsoft.com/office/powerpoint/2010/main" val="3332624021"/>
-      </p:ext>
-    </p:extLst>
-  </p:cSld>
-  <p:clrMapOvr>
-    <a:masterClrMapping/>
-  </p:clrMapOvr>
-</p:sld>
-</file>
-
-<file path=ppt/slides/slide8.xml><?xml version="1.0" encoding="utf-8"?>
-<p:sld xmlns:a="http://schemas.openxmlformats.org/drawingml/2006/main" xmlns:r="http://schemas.openxmlformats.org/officeDocument/2006/relationships" xmlns:p="http://schemas.openxmlformats.org/presentationml/2006/main">
-  <p:cSld>
-    <p:spTree>
-      <p:nvGrpSpPr>
-        <p:cNvPr id="1" name=""/>
-        <p:cNvGrpSpPr/>
-        <p:nvPr/>
-      </p:nvGrpSpPr>
-      <p:grpSpPr>
-        <a:xfrm>
-          <a:off x="0" y="0"/>
-          <a:ext cx="0" cy="0"/>
-          <a:chOff x="0" y="0"/>
-          <a:chExt cx="0" cy="0"/>
-        </a:xfrm>
-      </p:grpSpPr>
-      <p:sp>
-        <p:nvSpPr>
-          <p:cNvPr id="2" name="Title 1">
-            <a:extLst>
-              <a:ext uri="{FF2B5EF4-FFF2-40B4-BE49-F238E27FC236}">
-                <a16:creationId xmlns:a16="http://schemas.microsoft.com/office/drawing/2014/main" id="{20588642-DFFB-4D20-A52B-0ABA4364BA9B}"/>
-              </a:ext>
-            </a:extLst>
-          </p:cNvPr>
-          <p:cNvSpPr>
-            <a:spLocks noGrp="1"/>
-          </p:cNvSpPr>
-          <p:nvPr>
-            <p:ph type="title"/>
-          </p:nvPr>
-        </p:nvSpPr>
-        <p:spPr/>
-        <p:txBody>
-          <a:bodyPr>
-            <a:normAutofit/>
-          </a:bodyPr>
-          <a:lstStyle/>
-          <a:p>
-            <a:r>
-              <a:rPr lang="en-US" sz="1800" dirty="0"/>
-              <a:t>List the department of each employee with the following information: </a:t>
-            </a:r>
-            <a:br>
-              <a:rPr lang="en-US" sz="1800" dirty="0"/>
-            </a:br>
-            <a:r>
-              <a:rPr lang="en-US" sz="1800" dirty="0"/>
-              <a:t>employee number, last name, first name, and department name.</a:t>
-            </a:r>
-          </a:p>
-        </p:txBody>
-      </p:sp>
-      <p:pic>
-        <p:nvPicPr>
-          <p:cNvPr id="4" name="Picture 3">
-            <a:extLst>
-              <a:ext uri="{FF2B5EF4-FFF2-40B4-BE49-F238E27FC236}">
-                <a16:creationId xmlns:a16="http://schemas.microsoft.com/office/drawing/2014/main" id="{120BA9A5-0050-4886-BBED-E23ED6BA461E}"/>
-              </a:ext>
-            </a:extLst>
-          </p:cNvPr>
-          <p:cNvPicPr>
-            <a:picLocks noChangeAspect="1"/>
-          </p:cNvPicPr>
-          <p:nvPr/>
-        </p:nvPicPr>
-        <p:blipFill>
-          <a:blip r:embed="rId2"/>
-          <a:stretch>
-            <a:fillRect/>
-          </a:stretch>
-        </p:blipFill>
-        <p:spPr>
-          <a:xfrm>
-            <a:off x="1524000" y="1495425"/>
-            <a:ext cx="9144000" cy="5143500"/>
-          </a:xfrm>
-          <a:prstGeom prst="rect">
-            <a:avLst/>
-          </a:prstGeom>
-        </p:spPr>
-      </p:pic>
-    </p:spTree>
-    <p:extLst>
-      <p:ext uri="{BB962C8B-B14F-4D97-AF65-F5344CB8AC3E}">
-        <p14:creationId xmlns:p14="http://schemas.microsoft.com/office/powerpoint/2010/main" val="826534142"/>
-      </p:ext>
-    </p:extLst>
-  </p:cSld>
-  <p:clrMapOvr>
-    <a:masterClrMapping/>
-  </p:clrMapOvr>
-</p:sld>
-</file>
-
-<file path=ppt/slides/slide9.xml><?xml version="1.0" encoding="utf-8"?>
-<p:sld xmlns:a="http://schemas.openxmlformats.org/drawingml/2006/main" xmlns:r="http://schemas.openxmlformats.org/officeDocument/2006/relationships" xmlns:p="http://schemas.openxmlformats.org/presentationml/2006/main">
-  <p:cSld>
-    <p:spTree>
-      <p:nvGrpSpPr>
-        <p:cNvPr id="1" name=""/>
-        <p:cNvGrpSpPr/>
-        <p:nvPr/>
-      </p:nvGrpSpPr>
-      <p:grpSpPr>
-        <a:xfrm>
-          <a:off x="0" y="0"/>
-          <a:ext cx="0" cy="0"/>
-          <a:chOff x="0" y="0"/>
-          <a:chExt cx="0" cy="0"/>
-        </a:xfrm>
-      </p:grpSpPr>
-      <p:sp>
-        <p:nvSpPr>
-          <p:cNvPr id="2" name="Title 1">
-            <a:extLst>
-              <a:ext uri="{FF2B5EF4-FFF2-40B4-BE49-F238E27FC236}">
-                <a16:creationId xmlns:a16="http://schemas.microsoft.com/office/drawing/2014/main" id="{20588642-DFFB-4D20-A52B-0ABA4364BA9B}"/>
-              </a:ext>
-            </a:extLst>
-          </p:cNvPr>
-          <p:cNvSpPr>
-            <a:spLocks noGrp="1"/>
-          </p:cNvSpPr>
-          <p:nvPr>
-            <p:ph type="title"/>
-          </p:nvPr>
-        </p:nvSpPr>
-        <p:spPr/>
-        <p:txBody>
-          <a:bodyPr>
-            <a:normAutofit/>
-          </a:bodyPr>
-          <a:lstStyle/>
-          <a:p>
-            <a:r>
-              <a:rPr lang="en-US" sz="1800" dirty="0"/>
-              <a:t>List first name, last name, and sex for employees whose first name is "Hercules" and last names begin with "B."</a:t>
-            </a:r>
-          </a:p>
-        </p:txBody>
-      </p:sp>
-      <p:pic>
-        <p:nvPicPr>
-          <p:cNvPr id="4" name="Picture 3">
-            <a:extLst>
-              <a:ext uri="{FF2B5EF4-FFF2-40B4-BE49-F238E27FC236}">
-                <a16:creationId xmlns:a16="http://schemas.microsoft.com/office/drawing/2014/main" id="{3D77C085-6527-4E86-9BD7-ADFB432C504C}"/>
-              </a:ext>
-            </a:extLst>
-          </p:cNvPr>
-          <p:cNvPicPr>
-            <a:picLocks noChangeAspect="1"/>
-          </p:cNvPicPr>
-          <p:nvPr/>
-        </p:nvPicPr>
-        <p:blipFill>
-          <a:blip r:embed="rId2"/>
-          <a:stretch>
-            <a:fillRect/>
-          </a:stretch>
-        </p:blipFill>
-        <p:spPr>
-          <a:xfrm>
-            <a:off x="1409700" y="1533525"/>
-            <a:ext cx="9144000" cy="5143500"/>
-          </a:xfrm>
-          <a:prstGeom prst="rect">
-            <a:avLst/>
-          </a:prstGeom>
-        </p:spPr>
-      </p:pic>
-    </p:spTree>
-    <p:extLst>
-      <p:ext uri="{BB962C8B-B14F-4D97-AF65-F5344CB8AC3E}">
-        <p14:creationId xmlns:p14="http://schemas.microsoft.com/office/powerpoint/2010/main" val="297949430"/>
       </p:ext>
     </p:extLst>
   </p:cSld>

</xml_diff>